<commit_message>
Adjust poster for readability
</commit_message>
<xml_diff>
--- a/posterMathEngBram.pptx
+++ b/posterMathEngBram.pptx
@@ -11,7 +11,7 @@
     <p:sldId id="256" r:id="rId2"/>
   </p:sldIdLst>
   <p:sldSz cx="30279975" cy="21404263"/>
-  <p:notesSz cx="6858000" cy="9144000"/>
+  <p:notesSz cx="7102475" cy="9388475"/>
   <p:defaultTextStyle>
     <a:defPPr>
       <a:defRPr lang="nl-BE"/>
@@ -180,7 +180,7 @@
           <a:lstStyle/>
           <a:p>
             <a:pPr>
-              <a:defRPr sz="1600" b="1" i="0" u="none" strike="noStrike" kern="1200" spc="100" baseline="0">
+              <a:defRPr sz="2000" b="1" i="0" u="none" strike="noStrike" kern="1200" spc="100" baseline="0">
                 <a:solidFill>
                   <a:schemeClr val="lt1">
                     <a:lumMod val="95000"/>
@@ -199,7 +199,7 @@
               </a:defRPr>
             </a:pPr>
             <a:r>
-              <a:rPr lang="en-US"/>
+              <a:rPr lang="en-US" sz="2000"/>
               <a:t>Linear solvers</a:t>
             </a:r>
           </a:p>
@@ -218,7 +218,7 @@
         <a:lstStyle/>
         <a:p>
           <a:pPr>
-            <a:defRPr sz="1600" b="1" i="0" u="none" strike="noStrike" kern="1200" spc="100" baseline="0">
+            <a:defRPr sz="2000" b="1" i="0" u="none" strike="noStrike" kern="1200" spc="100" baseline="0">
               <a:solidFill>
                 <a:schemeClr val="lt1">
                   <a:lumMod val="95000"/>
@@ -266,27 +266,24 @@
               <a:gsLst>
                 <a:gs pos="0">
                   <a:schemeClr val="accent1">
-                    <a:satMod val="103000"/>
-                    <a:lumMod val="102000"/>
-                    <a:tint val="94000"/>
+                    <a:shade val="51000"/>
+                    <a:satMod val="130000"/>
                   </a:schemeClr>
                 </a:gs>
-                <a:gs pos="50000">
+                <a:gs pos="80000">
                   <a:schemeClr val="accent1">
-                    <a:satMod val="110000"/>
-                    <a:lumMod val="100000"/>
-                    <a:shade val="100000"/>
+                    <a:shade val="93000"/>
+                    <a:satMod val="130000"/>
                   </a:schemeClr>
                 </a:gs>
                 <a:gs pos="100000">
                   <a:schemeClr val="accent1">
-                    <a:lumMod val="99000"/>
-                    <a:satMod val="120000"/>
-                    <a:shade val="78000"/>
+                    <a:shade val="94000"/>
+                    <a:satMod val="135000"/>
                   </a:schemeClr>
                 </a:gs>
               </a:gsLst>
-              <a:lin ang="5400000" scaled="0"/>
+              <a:lin ang="16200000" scaled="0"/>
             </a:gradFill>
             <a:ln>
               <a:noFill/>
@@ -371,27 +368,24 @@
               <a:gsLst>
                 <a:gs pos="0">
                   <a:schemeClr val="accent2">
-                    <a:satMod val="103000"/>
-                    <a:lumMod val="102000"/>
-                    <a:tint val="94000"/>
+                    <a:shade val="51000"/>
+                    <a:satMod val="130000"/>
                   </a:schemeClr>
                 </a:gs>
-                <a:gs pos="50000">
+                <a:gs pos="80000">
                   <a:schemeClr val="accent2">
-                    <a:satMod val="110000"/>
-                    <a:lumMod val="100000"/>
-                    <a:shade val="100000"/>
+                    <a:shade val="93000"/>
+                    <a:satMod val="130000"/>
                   </a:schemeClr>
                 </a:gs>
                 <a:gs pos="100000">
                   <a:schemeClr val="accent2">
-                    <a:lumMod val="99000"/>
-                    <a:satMod val="120000"/>
-                    <a:shade val="78000"/>
+                    <a:shade val="94000"/>
+                    <a:satMod val="135000"/>
                   </a:schemeClr>
                 </a:gs>
               </a:gsLst>
-              <a:lin ang="5400000" scaled="0"/>
+              <a:lin ang="16200000" scaled="0"/>
             </a:gradFill>
             <a:ln>
               <a:noFill/>
@@ -476,27 +470,24 @@
               <a:gsLst>
                 <a:gs pos="0">
                   <a:schemeClr val="accent3">
-                    <a:satMod val="103000"/>
-                    <a:lumMod val="102000"/>
-                    <a:tint val="94000"/>
+                    <a:shade val="51000"/>
+                    <a:satMod val="130000"/>
                   </a:schemeClr>
                 </a:gs>
-                <a:gs pos="50000">
+                <a:gs pos="80000">
                   <a:schemeClr val="accent3">
-                    <a:satMod val="110000"/>
-                    <a:lumMod val="100000"/>
-                    <a:shade val="100000"/>
+                    <a:shade val="93000"/>
+                    <a:satMod val="130000"/>
                   </a:schemeClr>
                 </a:gs>
                 <a:gs pos="100000">
                   <a:schemeClr val="accent3">
-                    <a:lumMod val="99000"/>
-                    <a:satMod val="120000"/>
-                    <a:shade val="78000"/>
+                    <a:shade val="94000"/>
+                    <a:satMod val="135000"/>
                   </a:schemeClr>
                 </a:gs>
               </a:gsLst>
-              <a:lin ang="5400000" scaled="0"/>
+              <a:lin ang="16200000" scaled="0"/>
             </a:gradFill>
             <a:ln>
               <a:noFill/>
@@ -589,7 +580,7 @@
               <a:lstStyle/>
               <a:p>
                 <a:pPr>
-                  <a:defRPr sz="900" b="1" i="0" u="none" strike="noStrike" kern="1200" cap="all" baseline="0">
+                  <a:defRPr sz="1800" b="1" i="0" u="none" strike="noStrike" kern="1200" cap="all" baseline="0">
                     <a:solidFill>
                       <a:schemeClr val="lt1">
                         <a:lumMod val="85000"/>
@@ -601,14 +592,14 @@
                   </a:defRPr>
                 </a:pPr>
                 <a:r>
-                  <a:rPr lang="en-US"/>
+                  <a:rPr lang="en-US" sz="1800"/>
                   <a:t>Fine</a:t>
                 </a:r>
                 <a:r>
-                  <a:rPr lang="en-US" baseline="0"/>
+                  <a:rPr lang="en-US" sz="1800" baseline="0"/>
                   <a:t> solver</a:t>
                 </a:r>
-                <a:endParaRPr lang="en-US"/>
+                <a:endParaRPr lang="en-US" sz="1800"/>
               </a:p>
             </c:rich>
           </c:tx>
@@ -625,7 +616,7 @@
             <a:lstStyle/>
             <a:p>
               <a:pPr>
-                <a:defRPr sz="900" b="1" i="0" u="none" strike="noStrike" kern="1200" cap="all" baseline="0">
+                <a:defRPr sz="1800" b="1" i="0" u="none" strike="noStrike" kern="1200" cap="all" baseline="0">
                   <a:solidFill>
                     <a:schemeClr val="lt1">
                       <a:lumMod val="85000"/>
@@ -662,7 +653,7 @@
           <a:lstStyle/>
           <a:p>
             <a:pPr>
-              <a:defRPr sz="900" b="0" i="0" u="none" strike="noStrike" kern="1200" baseline="0">
+              <a:defRPr sz="1600" b="0" i="0" u="none" strike="noStrike" kern="1200" baseline="0">
                 <a:solidFill>
                   <a:schemeClr val="lt1">
                     <a:lumMod val="85000"/>
@@ -711,7 +702,7 @@
               <a:lstStyle/>
               <a:p>
                 <a:pPr>
-                  <a:defRPr sz="900" b="1" i="0" u="none" strike="noStrike" kern="1200" cap="all" baseline="0">
+                  <a:defRPr sz="1800" b="1" i="0" u="none" strike="noStrike" kern="1200" cap="all" baseline="0">
                     <a:solidFill>
                       <a:schemeClr val="lt1">
                         <a:lumMod val="85000"/>
@@ -723,7 +714,7 @@
                   </a:defRPr>
                 </a:pPr>
                 <a:r>
-                  <a:rPr lang="en-US"/>
+                  <a:rPr lang="en-US" sz="1800"/>
                   <a:t>Speedup</a:t>
                 </a:r>
               </a:p>
@@ -742,7 +733,7 @@
             <a:lstStyle/>
             <a:p>
               <a:pPr>
-                <a:defRPr sz="900" b="1" i="0" u="none" strike="noStrike" kern="1200" cap="all" baseline="0">
+                <a:defRPr sz="1800" b="1" i="0" u="none" strike="noStrike" kern="1200" cap="all" baseline="0">
                   <a:solidFill>
                     <a:schemeClr val="lt1">
                       <a:lumMod val="85000"/>
@@ -773,7 +764,7 @@
           <a:lstStyle/>
           <a:p>
             <a:pPr>
-              <a:defRPr sz="900" b="0" i="0" u="none" strike="noStrike" kern="1200" baseline="0">
+              <a:defRPr sz="1400" b="0" i="0" u="none" strike="noStrike" kern="1200" baseline="0">
                 <a:solidFill>
                   <a:schemeClr val="lt1">
                     <a:lumMod val="85000"/>
@@ -814,7 +805,7 @@
         <a:lstStyle/>
         <a:p>
           <a:pPr>
-            <a:defRPr sz="900" b="0" i="0" u="none" strike="noStrike" kern="1200" baseline="0">
+            <a:defRPr sz="1600" b="0" i="0" u="none" strike="noStrike" kern="1200" baseline="0">
               <a:solidFill>
                 <a:schemeClr val="lt1">
                   <a:lumMod val="85000"/>
@@ -896,7 +887,7 @@
           <a:lstStyle/>
           <a:p>
             <a:pPr>
-              <a:defRPr sz="1600" b="1" i="0" u="none" strike="noStrike" kern="1200" spc="100" baseline="0">
+              <a:defRPr sz="2000" b="1" i="0" u="none" strike="noStrike" kern="1200" spc="100" baseline="0">
                 <a:solidFill>
                   <a:schemeClr val="lt1">
                     <a:lumMod val="95000"/>
@@ -915,7 +906,7 @@
               </a:defRPr>
             </a:pPr>
             <a:r>
-              <a:rPr lang="en-US"/>
+              <a:rPr lang="en-US" sz="2000"/>
               <a:t>Linear solvers</a:t>
             </a:r>
           </a:p>
@@ -934,7 +925,7 @@
         <a:lstStyle/>
         <a:p>
           <a:pPr>
-            <a:defRPr sz="1600" b="1" i="0" u="none" strike="noStrike" kern="1200" spc="100" baseline="0">
+            <a:defRPr sz="2000" b="1" i="0" u="none" strike="noStrike" kern="1200" spc="100" baseline="0">
               <a:solidFill>
                 <a:schemeClr val="lt1">
                   <a:lumMod val="95000"/>
@@ -982,27 +973,24 @@
               <a:gsLst>
                 <a:gs pos="0">
                   <a:schemeClr val="accent1">
-                    <a:satMod val="103000"/>
-                    <a:lumMod val="102000"/>
-                    <a:tint val="94000"/>
+                    <a:shade val="51000"/>
+                    <a:satMod val="130000"/>
                   </a:schemeClr>
                 </a:gs>
-                <a:gs pos="50000">
+                <a:gs pos="80000">
                   <a:schemeClr val="accent1">
-                    <a:satMod val="110000"/>
-                    <a:lumMod val="100000"/>
-                    <a:shade val="100000"/>
+                    <a:shade val="93000"/>
+                    <a:satMod val="130000"/>
                   </a:schemeClr>
                 </a:gs>
                 <a:gs pos="100000">
                   <a:schemeClr val="accent1">
-                    <a:lumMod val="99000"/>
-                    <a:satMod val="120000"/>
-                    <a:shade val="78000"/>
+                    <a:shade val="94000"/>
+                    <a:satMod val="135000"/>
                   </a:schemeClr>
                 </a:gs>
               </a:gsLst>
-              <a:lin ang="5400000" scaled="0"/>
+              <a:lin ang="16200000" scaled="0"/>
             </a:gradFill>
             <a:ln>
               <a:noFill/>
@@ -1087,27 +1075,24 @@
               <a:gsLst>
                 <a:gs pos="0">
                   <a:schemeClr val="accent2">
-                    <a:satMod val="103000"/>
-                    <a:lumMod val="102000"/>
-                    <a:tint val="94000"/>
+                    <a:shade val="51000"/>
+                    <a:satMod val="130000"/>
                   </a:schemeClr>
                 </a:gs>
-                <a:gs pos="50000">
+                <a:gs pos="80000">
                   <a:schemeClr val="accent2">
-                    <a:satMod val="110000"/>
-                    <a:lumMod val="100000"/>
-                    <a:shade val="100000"/>
+                    <a:shade val="93000"/>
+                    <a:satMod val="130000"/>
                   </a:schemeClr>
                 </a:gs>
                 <a:gs pos="100000">
                   <a:schemeClr val="accent2">
-                    <a:lumMod val="99000"/>
-                    <a:satMod val="120000"/>
-                    <a:shade val="78000"/>
+                    <a:shade val="94000"/>
+                    <a:satMod val="135000"/>
                   </a:schemeClr>
                 </a:gs>
               </a:gsLst>
-              <a:lin ang="5400000" scaled="0"/>
+              <a:lin ang="16200000" scaled="0"/>
             </a:gradFill>
             <a:ln>
               <a:noFill/>
@@ -1192,27 +1177,24 @@
               <a:gsLst>
                 <a:gs pos="0">
                   <a:schemeClr val="accent3">
-                    <a:satMod val="103000"/>
-                    <a:lumMod val="102000"/>
-                    <a:tint val="94000"/>
+                    <a:shade val="51000"/>
+                    <a:satMod val="130000"/>
                   </a:schemeClr>
                 </a:gs>
-                <a:gs pos="50000">
+                <a:gs pos="80000">
                   <a:schemeClr val="accent3">
-                    <a:satMod val="110000"/>
-                    <a:lumMod val="100000"/>
-                    <a:shade val="100000"/>
+                    <a:shade val="93000"/>
+                    <a:satMod val="130000"/>
                   </a:schemeClr>
                 </a:gs>
                 <a:gs pos="100000">
                   <a:schemeClr val="accent3">
-                    <a:lumMod val="99000"/>
-                    <a:satMod val="120000"/>
-                    <a:shade val="78000"/>
+                    <a:shade val="94000"/>
+                    <a:satMod val="135000"/>
                   </a:schemeClr>
                 </a:gs>
               </a:gsLst>
-              <a:lin ang="5400000" scaled="0"/>
+              <a:lin ang="16200000" scaled="0"/>
             </a:gradFill>
             <a:ln>
               <a:noFill/>
@@ -1305,7 +1287,7 @@
               <a:lstStyle/>
               <a:p>
                 <a:pPr>
-                  <a:defRPr sz="900" b="1" i="0" u="none" strike="noStrike" kern="1200" cap="all" baseline="0">
+                  <a:defRPr sz="1800" b="1" i="0" u="none" strike="noStrike" kern="1200" cap="all" baseline="0">
                     <a:solidFill>
                       <a:schemeClr val="lt1">
                         <a:lumMod val="85000"/>
@@ -1317,7 +1299,7 @@
                   </a:defRPr>
                 </a:pPr>
                 <a:r>
-                  <a:rPr lang="en-US"/>
+                  <a:rPr lang="en-US" sz="1800"/>
                   <a:t>Fine solver</a:t>
                 </a:r>
               </a:p>
@@ -1336,7 +1318,7 @@
             <a:lstStyle/>
             <a:p>
               <a:pPr>
-                <a:defRPr sz="900" b="1" i="0" u="none" strike="noStrike" kern="1200" cap="all" baseline="0">
+                <a:defRPr sz="1800" b="1" i="0" u="none" strike="noStrike" kern="1200" cap="all" baseline="0">
                   <a:solidFill>
                     <a:schemeClr val="lt1">
                       <a:lumMod val="85000"/>
@@ -1373,7 +1355,7 @@
           <a:lstStyle/>
           <a:p>
             <a:pPr>
-              <a:defRPr sz="900" b="0" i="0" u="none" strike="noStrike" kern="1200" baseline="0">
+              <a:defRPr sz="1600" b="0" i="0" u="none" strike="noStrike" kern="1200" baseline="0">
                 <a:solidFill>
                   <a:schemeClr val="lt1">
                     <a:lumMod val="85000"/>
@@ -1422,7 +1404,7 @@
               <a:lstStyle/>
               <a:p>
                 <a:pPr>
-                  <a:defRPr sz="900" b="1" i="0" u="none" strike="noStrike" kern="1200" cap="all" baseline="0">
+                  <a:defRPr sz="1800" b="1" i="0" u="none" strike="noStrike" kern="1200" cap="all" baseline="0">
                     <a:solidFill>
                       <a:schemeClr val="lt1">
                         <a:lumMod val="85000"/>
@@ -1434,12 +1416,40 @@
                   </a:defRPr>
                 </a:pPr>
                 <a:r>
-                  <a:rPr lang="en-US"/>
-                  <a:t>T_parareal</a:t>
+                  <a:rPr lang="en-US" sz="1800" dirty="0"/>
+                  <a:t>Time  for </a:t>
+                </a:r>
+                <a:r>
+                  <a:rPr lang="en-US" sz="1800" dirty="0" err="1"/>
+                  <a:t>parareal</a:t>
+                </a:r>
+                <a:r>
+                  <a:rPr lang="en-US" sz="1800" dirty="0"/>
+                  <a:t> </a:t>
+                </a:r>
+                <a:r>
+                  <a:rPr lang="en-US" sz="1800" b="1" dirty="0"/>
+                  <a:t>(</a:t>
+                </a:r>
+                <a:r>
+                  <a:rPr lang="en-US" sz="1800" b="1" cap="none" dirty="0" err="1"/>
+                  <a:t>ms</a:t>
+                </a:r>
+                <a:r>
+                  <a:rPr lang="en-US" sz="1800" dirty="0"/>
+                  <a:t>)</a:t>
                 </a:r>
               </a:p>
             </c:rich>
           </c:tx>
+          <c:layout>
+            <c:manualLayout>
+              <c:xMode val="edge"/>
+              <c:yMode val="edge"/>
+              <c:x val="3.3211043761651925E-2"/>
+              <c:y val="0.17423326619522608"/>
+            </c:manualLayout>
+          </c:layout>
           <c:overlay val="0"/>
           <c:spPr>
             <a:noFill/>
@@ -1453,7 +1463,7 @@
             <a:lstStyle/>
             <a:p>
               <a:pPr>
-                <a:defRPr sz="900" b="1" i="0" u="none" strike="noStrike" kern="1200" cap="all" baseline="0">
+                <a:defRPr sz="1800" b="1" i="0" u="none" strike="noStrike" kern="1200" cap="all" baseline="0">
                   <a:solidFill>
                     <a:schemeClr val="lt1">
                       <a:lumMod val="85000"/>
@@ -1484,7 +1494,7 @@
           <a:lstStyle/>
           <a:p>
             <a:pPr>
-              <a:defRPr sz="900" b="0" i="0" u="none" strike="noStrike" kern="1200" baseline="0">
+              <a:defRPr sz="1400" b="0" i="0" u="none" strike="noStrike" kern="1200" baseline="0">
                 <a:solidFill>
                   <a:schemeClr val="lt1">
                     <a:lumMod val="85000"/>
@@ -1525,7 +1535,7 @@
         <a:lstStyle/>
         <a:p>
           <a:pPr>
-            <a:defRPr sz="900" b="0" i="0" u="none" strike="noStrike" kern="1200" baseline="0">
+            <a:defRPr sz="1600" b="0" i="0" u="none" strike="noStrike" kern="1200" baseline="0">
               <a:solidFill>
                 <a:schemeClr val="lt1">
                   <a:lumMod val="85000"/>
@@ -1607,7 +1617,7 @@
           <a:lstStyle/>
           <a:p>
             <a:pPr>
-              <a:defRPr sz="1600" b="1" i="0" u="none" strike="noStrike" kern="1200" spc="100" baseline="0">
+              <a:defRPr sz="2000" b="1" i="0" u="none" strike="noStrike" kern="1200" spc="100" baseline="0">
                 <a:solidFill>
                   <a:schemeClr val="lt1">
                     <a:lumMod val="95000"/>
@@ -1626,7 +1636,7 @@
               </a:defRPr>
             </a:pPr>
             <a:r>
-              <a:rPr lang="en-US"/>
+              <a:rPr lang="en-US" sz="2000"/>
               <a:t>Temporal refinement</a:t>
             </a:r>
           </a:p>
@@ -1645,7 +1655,7 @@
         <a:lstStyle/>
         <a:p>
           <a:pPr>
-            <a:defRPr sz="1600" b="1" i="0" u="none" strike="noStrike" kern="1200" spc="100" baseline="0">
+            <a:defRPr sz="2000" b="1" i="0" u="none" strike="noStrike" kern="1200" spc="100" baseline="0">
               <a:solidFill>
                 <a:schemeClr val="lt1">
                   <a:lumMod val="95000"/>
@@ -1677,9 +1687,9 @@
           <c:idx val="0"/>
           <c:order val="0"/>
           <c:spPr>
-            <a:ln w="9525" cap="rnd">
+            <a:ln w="25400" cap="rnd">
               <a:solidFill>
-                <a:schemeClr val="accent1"/>
+                <a:schemeClr val="accent6"/>
               </a:solidFill>
               <a:round/>
             </a:ln>
@@ -1698,32 +1708,29 @@
               <a:gradFill rotWithShape="1">
                 <a:gsLst>
                   <a:gs pos="0">
-                    <a:schemeClr val="accent1">
-                      <a:satMod val="103000"/>
-                      <a:lumMod val="102000"/>
-                      <a:tint val="94000"/>
+                    <a:schemeClr val="accent6">
+                      <a:shade val="51000"/>
+                      <a:satMod val="130000"/>
                     </a:schemeClr>
                   </a:gs>
-                  <a:gs pos="50000">
-                    <a:schemeClr val="accent1">
-                      <a:satMod val="110000"/>
-                      <a:lumMod val="100000"/>
-                      <a:shade val="100000"/>
+                  <a:gs pos="80000">
+                    <a:schemeClr val="accent6">
+                      <a:shade val="93000"/>
+                      <a:satMod val="130000"/>
                     </a:schemeClr>
                   </a:gs>
                   <a:gs pos="100000">
-                    <a:schemeClr val="accent1">
-                      <a:lumMod val="99000"/>
-                      <a:satMod val="120000"/>
-                      <a:shade val="78000"/>
+                    <a:schemeClr val="accent6">
+                      <a:shade val="94000"/>
+                      <a:satMod val="135000"/>
                     </a:schemeClr>
                   </a:gs>
                 </a:gsLst>
-                <a:lin ang="5400000" scaled="0"/>
+                <a:lin ang="16200000" scaled="0"/>
               </a:gradFill>
-              <a:ln w="9525" cap="rnd">
-                <a:solidFill>
-                  <a:schemeClr val="accent1"/>
+              <a:ln w="38100" cap="rnd">
+                <a:solidFill>
+                  <a:schemeClr val="accent6"/>
                 </a:solidFill>
                 <a:round/>
               </a:ln>
@@ -1798,7 +1805,7 @@
           <c:smooth val="0"/>
           <c:extLst>
             <c:ext xmlns:c16="http://schemas.microsoft.com/office/drawing/2014/chart" uri="{C3380CC4-5D6E-409C-BE32-E72D297353CC}">
-              <c16:uniqueId val="{00000000-E076-44DE-85F2-9ABCFB85C340}"/>
+              <c16:uniqueId val="{00000000-3925-46EF-A726-3837A3A7D8F2}"/>
             </c:ext>
           </c:extLst>
         </c:ser>
@@ -1853,17 +1860,22 @@
                   </a:defRPr>
                 </a:pPr>
                 <a:r>
-                  <a:rPr lang="en-US"/>
-                  <a:t>Δt_c/</a:t>
+                  <a:rPr lang="en-US" sz="1800" dirty="0" err="1"/>
+                  <a:t>Δt_G</a:t>
                 </a:r>
                 <a:r>
-                  <a:rPr lang="el-GR"/>
+                  <a:rPr lang="en-US" sz="1800" dirty="0"/>
+                  <a:t>/</a:t>
+                </a:r>
+                <a:r>
+                  <a:rPr lang="el-GR" sz="1800" dirty="0"/>
                   <a:t>Δ</a:t>
                 </a:r>
                 <a:r>
-                  <a:rPr lang="en-US"/>
+                  <a:rPr lang="en-US" sz="1800" dirty="0" err="1"/>
                   <a:t>t_F</a:t>
                 </a:r>
+                <a:endParaRPr lang="en-US" sz="1800" dirty="0"/>
               </a:p>
             </c:rich>
           </c:tx>
@@ -1915,7 +1927,7 @@
           <a:lstStyle/>
           <a:p>
             <a:pPr>
-              <a:defRPr sz="900" b="0" i="0" u="none" strike="noStrike" kern="1200" baseline="0">
+              <a:defRPr sz="1600" b="0" i="0" u="none" strike="noStrike" kern="1200" baseline="0">
                 <a:solidFill>
                   <a:schemeClr val="lt1">
                     <a:lumMod val="75000"/>
@@ -1973,7 +1985,7 @@
                   </a:defRPr>
                 </a:pPr>
                 <a:r>
-                  <a:rPr lang="en-US"/>
+                  <a:rPr lang="en-US" sz="1800"/>
                   <a:t>speedup</a:t>
                 </a:r>
               </a:p>
@@ -2027,7 +2039,7 @@
           <a:lstStyle/>
           <a:p>
             <a:pPr>
-              <a:defRPr sz="900" b="0" i="0" u="none" strike="noStrike" kern="1200" baseline="0">
+              <a:defRPr sz="1600" b="0" i="0" u="none" strike="noStrike" kern="1200" baseline="0">
                 <a:solidFill>
                   <a:schemeClr val="lt1">
                     <a:lumMod val="75000"/>
@@ -2180,13 +2192,10 @@
 </file>
 
 <file path=ppt/charts/colors3.xml><?xml version="1.0" encoding="utf-8"?>
-<cs:colorStyle xmlns:cs="http://schemas.microsoft.com/office/drawing/2012/chartStyle" xmlns:a="http://schemas.openxmlformats.org/drawingml/2006/main" meth="cycle" id="10">
-  <a:schemeClr val="accent1"/>
-  <a:schemeClr val="accent2"/>
-  <a:schemeClr val="accent3"/>
+<cs:colorStyle xmlns:cs="http://schemas.microsoft.com/office/drawing/2012/chartStyle" xmlns:a="http://schemas.openxmlformats.org/drawingml/2006/main" meth="cycle" id="13">
+  <a:schemeClr val="accent6"/>
+  <a:schemeClr val="accent5"/>
   <a:schemeClr val="accent4"/>
-  <a:schemeClr val="accent5"/>
-  <a:schemeClr val="accent6"/>
   <cs:variation/>
   <cs:variation>
     <a:lumMod val="60000"/>
@@ -3748,14 +3757,14 @@
         <p:spPr>
           <a:xfrm>
             <a:off x="0" y="0"/>
-            <a:ext cx="2971800" cy="458788"/>
+            <a:ext cx="3077739" cy="471054"/>
           </a:xfrm>
           <a:prstGeom prst="rect">
             <a:avLst/>
           </a:prstGeom>
         </p:spPr>
         <p:txBody>
-          <a:bodyPr vert="horz" lIns="91440" tIns="45720" rIns="91440" bIns="45720" rtlCol="0"/>
+          <a:bodyPr vert="horz" lIns="94229" tIns="47114" rIns="94229" bIns="47114" rtlCol="0"/>
           <a:lstStyle>
             <a:lvl1pPr algn="l">
               <a:defRPr sz="1200"/>
@@ -3778,15 +3787,15 @@
         </p:nvSpPr>
         <p:spPr>
           <a:xfrm>
-            <a:off x="3884613" y="0"/>
-            <a:ext cx="2971800" cy="458788"/>
+            <a:off x="4023092" y="0"/>
+            <a:ext cx="3077739" cy="471054"/>
           </a:xfrm>
           <a:prstGeom prst="rect">
             <a:avLst/>
           </a:prstGeom>
         </p:spPr>
         <p:txBody>
-          <a:bodyPr vert="horz" lIns="91440" tIns="45720" rIns="91440" bIns="45720" rtlCol="0"/>
+          <a:bodyPr vert="horz" lIns="94229" tIns="47114" rIns="94229" bIns="47114" rtlCol="0"/>
           <a:lstStyle>
             <a:lvl1pPr algn="r">
               <a:defRPr sz="1200"/>
@@ -3795,7 +3804,7 @@
           <a:p>
             <a:fld id="{ECC9400D-CA37-4854-AA96-BE58EABA378F}" type="datetimeFigureOut">
               <a:rPr lang="nl-BE" smtClean="0"/>
-              <a:t>24/04/2024</a:t>
+              <a:t>26/04/2024</a:t>
             </a:fld>
             <a:endParaRPr lang="nl-BE"/>
           </a:p>
@@ -3813,8 +3822,8 @@
         </p:nvSpPr>
         <p:spPr>
           <a:xfrm>
-            <a:off x="1246188" y="1143000"/>
-            <a:ext cx="4365625" cy="3086100"/>
+            <a:off x="1309688" y="1173163"/>
+            <a:ext cx="4483100" cy="3168650"/>
           </a:xfrm>
           <a:prstGeom prst="rect">
             <a:avLst/>
@@ -3827,7 +3836,7 @@
           </a:ln>
         </p:spPr>
         <p:txBody>
-          <a:bodyPr vert="horz" lIns="91440" tIns="45720" rIns="91440" bIns="45720" rtlCol="0" anchor="ctr"/>
+          <a:bodyPr vert="horz" lIns="94229" tIns="47114" rIns="94229" bIns="47114" rtlCol="0" anchor="ctr"/>
           <a:lstStyle/>
           <a:p>
             <a:endParaRPr lang="nl-BE"/>
@@ -3846,15 +3855,15 @@
         </p:nvSpPr>
         <p:spPr>
           <a:xfrm>
-            <a:off x="685800" y="4400550"/>
-            <a:ext cx="5486400" cy="3600450"/>
+            <a:off x="710248" y="4518204"/>
+            <a:ext cx="5681980" cy="3696712"/>
           </a:xfrm>
           <a:prstGeom prst="rect">
             <a:avLst/>
           </a:prstGeom>
         </p:spPr>
         <p:txBody>
-          <a:bodyPr vert="horz" lIns="91440" tIns="45720" rIns="91440" bIns="45720" rtlCol="0"/>
+          <a:bodyPr vert="horz" lIns="94229" tIns="47114" rIns="94229" bIns="47114" rtlCol="0"/>
           <a:lstStyle/>
           <a:p>
             <a:pPr lvl="0"/>
@@ -3906,15 +3915,15 @@
         </p:nvSpPr>
         <p:spPr>
           <a:xfrm>
-            <a:off x="0" y="8685213"/>
-            <a:ext cx="2971800" cy="458787"/>
+            <a:off x="0" y="8917422"/>
+            <a:ext cx="3077739" cy="471053"/>
           </a:xfrm>
           <a:prstGeom prst="rect">
             <a:avLst/>
           </a:prstGeom>
         </p:spPr>
         <p:txBody>
-          <a:bodyPr vert="horz" lIns="91440" tIns="45720" rIns="91440" bIns="45720" rtlCol="0" anchor="b"/>
+          <a:bodyPr vert="horz" lIns="94229" tIns="47114" rIns="94229" bIns="47114" rtlCol="0" anchor="b"/>
           <a:lstStyle>
             <a:lvl1pPr algn="l">
               <a:defRPr sz="1200"/>
@@ -3937,15 +3946,15 @@
         </p:nvSpPr>
         <p:spPr>
           <a:xfrm>
-            <a:off x="3884613" y="8685213"/>
-            <a:ext cx="2971800" cy="458787"/>
+            <a:off x="4023092" y="8917422"/>
+            <a:ext cx="3077739" cy="471053"/>
           </a:xfrm>
           <a:prstGeom prst="rect">
             <a:avLst/>
           </a:prstGeom>
         </p:spPr>
         <p:txBody>
-          <a:bodyPr vert="horz" lIns="91440" tIns="45720" rIns="91440" bIns="45720" rtlCol="0" anchor="b"/>
+          <a:bodyPr vert="horz" lIns="94229" tIns="47114" rIns="94229" bIns="47114" rtlCol="0" anchor="b"/>
           <a:lstStyle>
             <a:lvl1pPr algn="r">
               <a:defRPr sz="1200"/>
@@ -4242,7 +4251,7 @@
               <a:pPr>
                 <a:defRPr/>
               </a:pPr>
-              <a:t>24/04/2024</a:t>
+              <a:t>26/04/2024</a:t>
             </a:fld>
             <a:endParaRPr lang="nl-BE"/>
           </a:p>
@@ -4444,7 +4453,7 @@
               <a:pPr>
                 <a:defRPr/>
               </a:pPr>
-              <a:t>24/04/2024</a:t>
+              <a:t>26/04/2024</a:t>
             </a:fld>
             <a:endParaRPr lang="nl-BE"/>
           </a:p>
@@ -4636,7 +4645,7 @@
               <a:pPr>
                 <a:defRPr/>
               </a:pPr>
-              <a:t>24/04/2024</a:t>
+              <a:t>26/04/2024</a:t>
             </a:fld>
             <a:endParaRPr lang="nl-BE"/>
           </a:p>
@@ -4904,7 +4913,7 @@
               <a:pPr>
                 <a:defRPr/>
               </a:pPr>
-              <a:t>24/04/2024</a:t>
+              <a:t>26/04/2024</a:t>
             </a:fld>
             <a:endParaRPr lang="nl-BE"/>
           </a:p>
@@ -5214,7 +5223,7 @@
               <a:pPr>
                 <a:defRPr/>
               </a:pPr>
-              <a:t>24/04/2024</a:t>
+              <a:t>26/04/2024</a:t>
             </a:fld>
             <a:endParaRPr lang="nl-BE"/>
           </a:p>
@@ -5663,7 +5672,7 @@
               <a:pPr>
                 <a:defRPr/>
               </a:pPr>
-              <a:t>24/04/2024</a:t>
+              <a:t>26/04/2024</a:t>
             </a:fld>
             <a:endParaRPr lang="nl-BE"/>
           </a:p>
@@ -5803,7 +5812,7 @@
               <a:pPr>
                 <a:defRPr/>
               </a:pPr>
-              <a:t>24/04/2024</a:t>
+              <a:t>26/04/2024</a:t>
             </a:fld>
             <a:endParaRPr lang="nl-BE"/>
           </a:p>
@@ -5920,7 +5929,7 @@
               <a:pPr>
                 <a:defRPr/>
               </a:pPr>
-              <a:t>24/04/2024</a:t>
+              <a:t>26/04/2024</a:t>
             </a:fld>
             <a:endParaRPr lang="nl-BE"/>
           </a:p>
@@ -6219,7 +6228,7 @@
               <a:pPr>
                 <a:defRPr/>
               </a:pPr>
-              <a:t>24/04/2024</a:t>
+              <a:t>26/04/2024</a:t>
             </a:fld>
             <a:endParaRPr lang="nl-BE"/>
           </a:p>
@@ -6497,7 +6506,7 @@
               <a:pPr>
                 <a:defRPr/>
               </a:pPr>
-              <a:t>24/04/2024</a:t>
+              <a:t>26/04/2024</a:t>
             </a:fld>
             <a:endParaRPr lang="nl-BE"/>
           </a:p>
@@ -6789,7 +6798,7 @@
               <a:pPr>
                 <a:defRPr/>
               </a:pPr>
-              <a:t>24/04/2024</a:t>
+              <a:t>26/04/2024</a:t>
             </a:fld>
             <a:endParaRPr lang="nl-BE"/>
           </a:p>
@@ -7312,7 +7321,7 @@
         </p:nvSpPr>
         <p:spPr bwMode="auto">
           <a:xfrm>
-            <a:off x="441579" y="11158638"/>
+            <a:off x="441578" y="11286725"/>
             <a:ext cx="9553075" cy="1008063"/>
           </a:xfrm>
           <a:prstGeom prst="flowChartProcess">
@@ -7720,8 +7729,8 @@
         </p:nvSpPr>
         <p:spPr bwMode="auto">
           <a:xfrm>
-            <a:off x="441578" y="12401158"/>
-            <a:ext cx="9553075" cy="6395374"/>
+            <a:off x="441578" y="12440002"/>
+            <a:ext cx="9553075" cy="6356529"/>
           </a:xfrm>
           <a:prstGeom prst="rect">
             <a:avLst/>
@@ -7854,6 +7863,21 @@
             </a:r>
           </a:p>
           <a:p>
+            <a:pPr lvl="1" eaLnBrk="1" hangingPunct="1">
+              <a:spcBef>
+                <a:spcPct val="20000"/>
+              </a:spcBef>
+              <a:buFontTx/>
+              <a:buChar char="•"/>
+            </a:pPr>
+            <a:r>
+              <a:rPr lang="nl-BE" altLang="nl-BE" sz="3200" dirty="0">
+                <a:latin typeface="Calibri" panose="020F0502020204030204" pitchFamily="34" charset="0"/>
+              </a:rPr>
+              <a:t>E.g., the Sun, fusion reactors (Tokamaks and Stellarators), gas nebulae, etc.</a:t>
+            </a:r>
+          </a:p>
+          <a:p>
             <a:pPr eaLnBrk="1" hangingPunct="1">
               <a:spcBef>
                 <a:spcPct val="20000"/>
@@ -7865,22 +7889,7 @@
               <a:rPr lang="nl-BE" altLang="nl-BE" sz="3200" dirty="0">
                 <a:latin typeface="Calibri" panose="020F0502020204030204" pitchFamily="34" charset="0"/>
               </a:rPr>
-              <a:t> E.g. the sun, fusion reactors (Tokamaks and Stellarators), gas nebulae, etc.</a:t>
-            </a:r>
-          </a:p>
-          <a:p>
-            <a:pPr eaLnBrk="1" hangingPunct="1">
-              <a:spcBef>
-                <a:spcPct val="20000"/>
-              </a:spcBef>
-              <a:buFontTx/>
-              <a:buChar char="•"/>
-            </a:pPr>
-            <a:r>
-              <a:rPr lang="nl-BE" altLang="nl-BE" sz="3200" dirty="0">
-                <a:latin typeface="Calibri" panose="020F0502020204030204" pitchFamily="34" charset="0"/>
-              </a:rPr>
-              <a:t>Particle-in-cell methods can simulate macroscale phenomena without having to resolve small time scales</a:t>
+              <a:t>Particle-in-cell methods (implicit and semi-implicit) can simulate macroscale phenomena without having to resolve small time scales</a:t>
             </a:r>
           </a:p>
           <a:p>
@@ -7910,7 +7919,7 @@
               <a:rPr lang="nl-BE" altLang="nl-BE" sz="3200" dirty="0">
                 <a:latin typeface="Calibri" panose="020F0502020204030204" pitchFamily="34" charset="0"/>
               </a:rPr>
-              <a:t>Accurate while being reasonably computationally cheap</a:t>
+              <a:t>Highly accurate solutions but computationally expensive</a:t>
             </a:r>
           </a:p>
           <a:p>
@@ -8256,7 +8265,7 @@
         <p:spPr bwMode="auto">
           <a:xfrm>
             <a:off x="441580" y="3964916"/>
-            <a:ext cx="9553075" cy="6840537"/>
+            <a:ext cx="9553075" cy="7176594"/>
           </a:xfrm>
           <a:prstGeom prst="rect">
             <a:avLst/>
@@ -8415,7 +8424,7 @@
               <a:rPr lang="nl-BE" altLang="nl-BE" sz="3200" dirty="0">
                 <a:latin typeface="Calibri" panose="020F0502020204030204" pitchFamily="34" charset="0"/>
               </a:rPr>
-              <a:t>Parallelisation in space saturates</a:t>
+              <a:t>If parallelisation in space saturates</a:t>
             </a:r>
           </a:p>
           <a:p>
@@ -8456,7 +8465,7 @@
             <p:spPr bwMode="auto">
               <a:xfrm>
                 <a:off x="10367764" y="8234741"/>
-                <a:ext cx="9543602" cy="5194093"/>
+                <a:ext cx="9543602" cy="4497609"/>
               </a:xfrm>
               <a:prstGeom prst="rect">
                 <a:avLst/>
@@ -8585,7 +8594,177 @@
                   <a:rPr lang="nl-BE" altLang="nl-BE" sz="3200" dirty="0">
                     <a:latin typeface="Calibri" panose="020F0502020204030204" pitchFamily="34" charset="0"/>
                   </a:rPr>
-                  <a:t>Small error between Parareal vs serial solve</a:t>
+                  <a:t>High speedup = </a:t>
+                </a:r>
+                <a14:m>
+                  <m:oMath xmlns:m="http://schemas.openxmlformats.org/officeDocument/2006/math">
+                    <m:f>
+                      <m:fPr>
+                        <m:ctrlPr>
+                          <a:rPr lang="nl-BE" altLang="nl-BE" sz="3200" i="1">
+                            <a:latin typeface="Cambria Math" panose="02040503050406030204" pitchFamily="18" charset="0"/>
+                          </a:rPr>
+                        </m:ctrlPr>
+                      </m:fPr>
+                      <m:num>
+                        <m:r>
+                          <m:rPr>
+                            <m:nor/>
+                          </m:rPr>
+                          <a:rPr lang="en-US" altLang="nl-BE" sz="3200" b="0" i="0" smtClean="0">
+                            <a:latin typeface="Cambria Math" panose="02040503050406030204" pitchFamily="18" charset="0"/>
+                          </a:rPr>
+                          <m:t>Time</m:t>
+                        </m:r>
+                        <m:r>
+                          <m:rPr>
+                            <m:nor/>
+                          </m:rPr>
+                          <a:rPr lang="en-US" altLang="nl-BE" sz="3200" b="0" i="0" smtClean="0">
+                            <a:latin typeface="Cambria Math" panose="02040503050406030204" pitchFamily="18" charset="0"/>
+                          </a:rPr>
+                          <m:t> </m:t>
+                        </m:r>
+                        <m:r>
+                          <m:rPr>
+                            <m:nor/>
+                          </m:rPr>
+                          <a:rPr lang="en-US" altLang="nl-BE" sz="3200" b="0" i="0" smtClean="0">
+                            <a:latin typeface="Cambria Math" panose="02040503050406030204" pitchFamily="18" charset="0"/>
+                          </a:rPr>
+                          <m:t>needed</m:t>
+                        </m:r>
+                        <m:r>
+                          <m:rPr>
+                            <m:nor/>
+                          </m:rPr>
+                          <a:rPr lang="en-US" altLang="nl-BE" sz="3200" b="0" i="0" smtClean="0">
+                            <a:latin typeface="Cambria Math" panose="02040503050406030204" pitchFamily="18" charset="0"/>
+                          </a:rPr>
+                          <m:t> </m:t>
+                        </m:r>
+                        <m:r>
+                          <m:rPr>
+                            <m:nor/>
+                          </m:rPr>
+                          <a:rPr lang="en-US" altLang="nl-BE" sz="3200" b="0" i="0" smtClean="0">
+                            <a:latin typeface="Cambria Math" panose="02040503050406030204" pitchFamily="18" charset="0"/>
+                          </a:rPr>
+                          <m:t>for</m:t>
+                        </m:r>
+                        <m:r>
+                          <m:rPr>
+                            <m:nor/>
+                          </m:rPr>
+                          <a:rPr lang="en-US" altLang="nl-BE" sz="3200" b="0" i="0" smtClean="0">
+                            <a:latin typeface="Cambria Math" panose="02040503050406030204" pitchFamily="18" charset="0"/>
+                          </a:rPr>
+                          <m:t> </m:t>
+                        </m:r>
+                        <m:r>
+                          <m:rPr>
+                            <m:nor/>
+                          </m:rPr>
+                          <a:rPr lang="en-US" altLang="nl-BE" sz="3200" b="0" i="0" smtClean="0">
+                            <a:latin typeface="Cambria Math" panose="02040503050406030204" pitchFamily="18" charset="0"/>
+                          </a:rPr>
+                          <m:t>serial</m:t>
+                        </m:r>
+                      </m:num>
+                      <m:den>
+                        <m:r>
+                          <m:rPr>
+                            <m:nor/>
+                          </m:rPr>
+                          <a:rPr lang="en-US" altLang="nl-BE" sz="3200" b="0" i="0" smtClean="0">
+                            <a:latin typeface="Cambria Math" panose="02040503050406030204" pitchFamily="18" charset="0"/>
+                          </a:rPr>
+                          <m:t>Time</m:t>
+                        </m:r>
+                        <m:r>
+                          <m:rPr>
+                            <m:nor/>
+                          </m:rPr>
+                          <a:rPr lang="en-US" altLang="nl-BE" sz="3200" b="0" i="0" smtClean="0">
+                            <a:latin typeface="Cambria Math" panose="02040503050406030204" pitchFamily="18" charset="0"/>
+                          </a:rPr>
+                          <m:t> </m:t>
+                        </m:r>
+                        <m:r>
+                          <m:rPr>
+                            <m:nor/>
+                          </m:rPr>
+                          <a:rPr lang="en-US" altLang="nl-BE" sz="3200" b="0" i="0" smtClean="0">
+                            <a:latin typeface="Cambria Math" panose="02040503050406030204" pitchFamily="18" charset="0"/>
+                          </a:rPr>
+                          <m:t>needed</m:t>
+                        </m:r>
+                        <m:r>
+                          <m:rPr>
+                            <m:nor/>
+                          </m:rPr>
+                          <a:rPr lang="en-US" altLang="nl-BE" sz="3200" b="0" i="0" smtClean="0">
+                            <a:latin typeface="Cambria Math" panose="02040503050406030204" pitchFamily="18" charset="0"/>
+                          </a:rPr>
+                          <m:t> </m:t>
+                        </m:r>
+                        <m:r>
+                          <m:rPr>
+                            <m:nor/>
+                          </m:rPr>
+                          <a:rPr lang="en-US" altLang="nl-BE" sz="3200" b="0" i="0" smtClean="0">
+                            <a:latin typeface="Cambria Math" panose="02040503050406030204" pitchFamily="18" charset="0"/>
+                          </a:rPr>
+                          <m:t>for</m:t>
+                        </m:r>
+                        <m:r>
+                          <m:rPr>
+                            <m:nor/>
+                          </m:rPr>
+                          <a:rPr lang="en-US" altLang="nl-BE" sz="3200" b="0" i="0" smtClean="0">
+                            <a:latin typeface="Cambria Math" panose="02040503050406030204" pitchFamily="18" charset="0"/>
+                          </a:rPr>
+                          <m:t> </m:t>
+                        </m:r>
+                        <m:r>
+                          <m:rPr>
+                            <m:nor/>
+                          </m:rPr>
+                          <a:rPr lang="en-US" altLang="nl-BE" sz="3200" b="0" i="0" smtClean="0">
+                            <a:latin typeface="Cambria Math" panose="02040503050406030204" pitchFamily="18" charset="0"/>
+                          </a:rPr>
+                          <m:t>P</m:t>
+                        </m:r>
+                        <m:r>
+                          <m:rPr>
+                            <m:nor/>
+                          </m:rPr>
+                          <a:rPr lang="en-US" altLang="nl-BE" sz="3200" b="0" i="0" smtClean="0">
+                            <a:latin typeface="Cambria Math" panose="02040503050406030204" pitchFamily="18" charset="0"/>
+                          </a:rPr>
+                          <m:t>arareal</m:t>
+                        </m:r>
+                      </m:den>
+                    </m:f>
+                  </m:oMath>
+                </a14:m>
+                <a:endParaRPr lang="nl-BE" altLang="nl-BE" sz="3200" dirty="0">
+                  <a:latin typeface="Calibri" panose="020F0502020204030204" pitchFamily="34" charset="0"/>
+                </a:endParaRPr>
+              </a:p>
+              <a:p>
+                <a:pPr eaLnBrk="1" hangingPunct="1">
+                  <a:spcBef>
+                    <a:spcPct val="20000"/>
+                  </a:spcBef>
+                  <a:buFontTx/>
+                  <a:buChar char="•"/>
+                </a:pPr>
+                <a:r>
+                  <a:rPr lang="nl-BE" altLang="nl-BE" sz="3200" dirty="0">
+                    <a:latin typeface="Calibri" panose="020F0502020204030204" pitchFamily="34" charset="0"/>
+                  </a:rPr>
+                  <a:t>Parareal solution converges to serial fine solution</a:t>
                 </a:r>
               </a:p>
               <a:p>
@@ -8612,82 +8791,21 @@
                   <a:buChar char="•"/>
                 </a:pPr>
                 <a:r>
-                  <a:rPr lang="nl-BE" altLang="nl-BE" sz="3200" dirty="0">
+                  <a:rPr lang="en-US" altLang="nl-BE" sz="3200" dirty="0">
                     <a:latin typeface="Calibri" panose="020F0502020204030204" pitchFamily="34" charset="0"/>
                   </a:rPr>
-                  <a:t>High speedup = </a:t>
+                  <a:t>Small number of Parareal iterations, </a:t>
                 </a:r>
                 <a14:m>
                   <m:oMath xmlns:m="http://schemas.openxmlformats.org/officeDocument/2006/math">
-                    <m:f>
-                      <m:fPr>
-                        <m:ctrlPr>
-                          <a:rPr lang="nl-BE" altLang="nl-BE" sz="3200" i="1">
-                            <a:latin typeface="Cambria Math" panose="02040503050406030204" pitchFamily="18" charset="0"/>
-                          </a:rPr>
-                        </m:ctrlPr>
-                      </m:fPr>
-                      <m:num>
-                        <m:r>
-                          <a:rPr lang="en-US" altLang="nl-BE" sz="3200">
-                            <a:latin typeface="Cambria Math" panose="02040503050406030204" pitchFamily="18" charset="0"/>
-                          </a:rPr>
-                          <m:t>𝑇</m:t>
-                        </m:r>
-                        <m:r>
-                          <a:rPr lang="en-US" altLang="nl-BE" sz="3200">
-                            <a:latin typeface="Cambria Math" panose="02040503050406030204" pitchFamily="18" charset="0"/>
-                          </a:rPr>
-                          <m:t>_</m:t>
-                        </m:r>
-                        <m:r>
-                          <a:rPr lang="en-US" altLang="nl-BE" sz="3200">
-                            <a:latin typeface="Cambria Math" panose="02040503050406030204" pitchFamily="18" charset="0"/>
-                          </a:rPr>
-                          <m:t>𝑆𝑒𝑟𝑖𝑎𝑙</m:t>
-                        </m:r>
-                      </m:num>
-                      <m:den>
-                        <m:r>
-                          <a:rPr lang="en-US" altLang="nl-BE" sz="3200">
-                            <a:latin typeface="Cambria Math" panose="02040503050406030204" pitchFamily="18" charset="0"/>
-                          </a:rPr>
-                          <m:t>𝑇</m:t>
-                        </m:r>
-                        <m:r>
-                          <a:rPr lang="en-US" altLang="nl-BE" sz="3200">
-                            <a:latin typeface="Cambria Math" panose="02040503050406030204" pitchFamily="18" charset="0"/>
-                          </a:rPr>
-                          <m:t>_</m:t>
-                        </m:r>
-                        <m:r>
-                          <a:rPr lang="en-US" altLang="nl-BE" sz="3200">
-                            <a:latin typeface="Cambria Math" panose="02040503050406030204" pitchFamily="18" charset="0"/>
-                          </a:rPr>
-                          <m:t>𝑃𝑎𝑟𝑎𝑟𝑒𝑎𝑙</m:t>
-                        </m:r>
-                      </m:den>
-                    </m:f>
+                    <m:r>
+                      <a:rPr lang="en-US" altLang="nl-BE" sz="3200" b="0" i="1" smtClean="0">
+                        <a:latin typeface="Cambria Math" panose="02040503050406030204" pitchFamily="18" charset="0"/>
+                      </a:rPr>
+                      <m:t>𝐾</m:t>
+                    </m:r>
                   </m:oMath>
                 </a14:m>
-                <a:endParaRPr lang="nl-BE" altLang="nl-BE" sz="3200" dirty="0">
-                  <a:latin typeface="Calibri" panose="020F0502020204030204" pitchFamily="34" charset="0"/>
-                </a:endParaRPr>
-              </a:p>
-              <a:p>
-                <a:pPr eaLnBrk="1" hangingPunct="1">
-                  <a:spcBef>
-                    <a:spcPct val="20000"/>
-                  </a:spcBef>
-                  <a:buFontTx/>
-                  <a:buChar char="•"/>
-                </a:pPr>
-                <a:r>
-                  <a:rPr lang="en-US" altLang="nl-BE" sz="3200" dirty="0">
-                    <a:latin typeface="Calibri" panose="020F0502020204030204" pitchFamily="34" charset="0"/>
-                  </a:rPr>
-                  <a:t>Small number of Parareal iterations, K</a:t>
-                </a:r>
                 <a:endParaRPr lang="nl-BE" altLang="nl-BE" sz="3200" dirty="0">
                   <a:latin typeface="Calibri" panose="020F0502020204030204" pitchFamily="34" charset="0"/>
                 </a:endParaRPr>
@@ -8724,10 +8842,13 @@
                       </m:fPr>
                       <m:num>
                         <m:r>
-                          <a:rPr lang="en-US" altLang="nl-BE" sz="3200">
+                          <m:rPr>
+                            <m:nor/>
+                          </m:rPr>
+                          <a:rPr lang="en-US" altLang="nl-BE" sz="3200" i="0">
                             <a:latin typeface="Cambria Math" panose="02040503050406030204" pitchFamily="18" charset="0"/>
                           </a:rPr>
-                          <m:t>𝑆𝑝𝑒𝑒𝑑𝑢𝑝</m:t>
+                          <m:t>Speedup</m:t>
                         </m:r>
                       </m:num>
                       <m:den>
@@ -8738,10 +8859,22 @@
                           <m:t>#</m:t>
                         </m:r>
                         <m:r>
-                          <a:rPr lang="en-US" altLang="nl-BE" sz="3200">
+                          <m:rPr>
+                            <m:nor/>
+                          </m:rPr>
+                          <a:rPr lang="en-US" altLang="nl-BE" sz="3200" b="0" i="0" smtClean="0">
                             <a:latin typeface="Cambria Math" panose="02040503050406030204" pitchFamily="18" charset="0"/>
                           </a:rPr>
-                          <m:t>𝑝𝑟𝑜𝑐𝑒𝑠𝑠𝑜𝑟𝑠</m:t>
+                          <m:t>P</m:t>
+                        </m:r>
+                        <m:r>
+                          <m:rPr>
+                            <m:nor/>
+                          </m:rPr>
+                          <a:rPr lang="en-US" altLang="nl-BE" sz="3200" i="0">
+                            <a:latin typeface="Cambria Math" panose="02040503050406030204" pitchFamily="18" charset="0"/>
+                          </a:rPr>
+                          <m:t>rocessors</m:t>
                         </m:r>
                       </m:den>
                     </m:f>
@@ -8798,53 +8931,8 @@
                   <a:rPr lang="en-US" altLang="nl-BE" sz="3200" dirty="0">
                     <a:latin typeface="Calibri" panose="020F0502020204030204" pitchFamily="34" charset="0"/>
                   </a:rPr>
-                  <a:t>Check these results for different types of coarse solvers</a:t>
+                  <a:t>Investigate different types of coarse and fine solvers</a:t>
                 </a:r>
-              </a:p>
-              <a:p>
-                <a:pPr eaLnBrk="1" hangingPunct="1">
-                  <a:spcBef>
-                    <a:spcPct val="20000"/>
-                  </a:spcBef>
-                  <a:buFontTx/>
-                  <a:buChar char="•"/>
-                </a:pPr>
-                <a:endParaRPr lang="en-US" altLang="nl-BE" sz="4000" dirty="0">
-                  <a:latin typeface="Calibri" panose="020F0502020204030204" pitchFamily="34" charset="0"/>
-                </a:endParaRPr>
-              </a:p>
-              <a:p>
-                <a:pPr eaLnBrk="1" hangingPunct="1">
-                  <a:spcBef>
-                    <a:spcPct val="20000"/>
-                  </a:spcBef>
-                  <a:buFontTx/>
-                  <a:buChar char="•"/>
-                </a:pPr>
-                <a:endParaRPr lang="en-US" altLang="nl-BE" sz="4000" dirty="0">
-                  <a:latin typeface="Calibri" panose="020F0502020204030204" pitchFamily="34" charset="0"/>
-                </a:endParaRPr>
-              </a:p>
-              <a:p>
-                <a:pPr eaLnBrk="1" hangingPunct="1">
-                  <a:spcBef>
-                    <a:spcPct val="20000"/>
-                  </a:spcBef>
-                  <a:buFontTx/>
-                  <a:buChar char="•"/>
-                </a:pPr>
-                <a:endParaRPr lang="nl-BE" altLang="nl-BE" sz="4000" dirty="0">
-                  <a:latin typeface="Calibri" panose="020F0502020204030204" pitchFamily="34" charset="0"/>
-                </a:endParaRPr>
-              </a:p>
-              <a:p>
-                <a:pPr eaLnBrk="1" hangingPunct="1">
-                  <a:spcBef>
-                    <a:spcPct val="20000"/>
-                  </a:spcBef>
-                  <a:buFontTx/>
-                  <a:buChar char="•"/>
-                </a:pPr>
                 <a:endParaRPr lang="en-US" altLang="nl-BE" sz="4000" dirty="0">
                   <a:latin typeface="Calibri" panose="020F0502020204030204" pitchFamily="34" charset="0"/>
                 </a:endParaRPr>
@@ -8864,7 +8952,7 @@
             <p:spPr bwMode="auto">
               <a:xfrm>
                 <a:off x="10367764" y="8234741"/>
-                <a:ext cx="9543602" cy="5194093"/>
+                <a:ext cx="9543602" cy="4497609"/>
               </a:xfrm>
               <a:prstGeom prst="rect">
                 <a:avLst/>
@@ -8872,7 +8960,7 @@
               <a:blipFill>
                 <a:blip r:embed="rId2"/>
                 <a:stretch>
-                  <a:fillRect l="-702" t="-820"/>
+                  <a:fillRect l="-702"/>
                 </a:stretch>
               </a:blipFill>
               <a:ln w="9525" algn="ctr">
@@ -8910,7 +8998,7 @@
         <p:spPr bwMode="auto">
           <a:xfrm>
             <a:off x="20328100" y="3968986"/>
-            <a:ext cx="9510993" cy="10185959"/>
+            <a:ext cx="9510993" cy="11086317"/>
           </a:xfrm>
           <a:prstGeom prst="rect">
             <a:avLst/>
@@ -9057,7 +9145,7 @@
               <a:rPr lang="en-US" altLang="nl-BE" sz="3200" dirty="0">
                 <a:latin typeface="Calibri" panose="020F0502020204030204" pitchFamily="34" charset="0"/>
               </a:rPr>
-              <a:t>The more costly the fine solver, the better the speedup/parallel efficiency</a:t>
+              <a:t>The cheaper the coarse solver, the better the speedup/parallel efficiency</a:t>
             </a:r>
           </a:p>
           <a:p>
@@ -9162,7 +9250,19 @@
               <a:rPr lang="en-US" altLang="nl-BE" sz="3200" dirty="0">
                 <a:latin typeface="Calibri" panose="020F0502020204030204" pitchFamily="34" charset="0"/>
               </a:rPr>
-              <a:t>Coarse solver: iterative</a:t>
+              <a:t>Coarse solver: iterative, direct?</a:t>
+            </a:r>
+          </a:p>
+          <a:p>
+            <a:pPr lvl="2" eaLnBrk="1" hangingPunct="1">
+              <a:buFontTx/>
+              <a:buChar char="–"/>
+            </a:pPr>
+            <a:r>
+              <a:rPr lang="en-US" altLang="nl-BE" sz="3200" dirty="0">
+                <a:latin typeface="Calibri" panose="020F0502020204030204" pitchFamily="34" charset="0"/>
+              </a:rPr>
+              <a:t> Depends on problem setting and size</a:t>
             </a:r>
           </a:p>
         </p:txBody>
@@ -9467,7 +9567,7 @@
         </p:nvSpPr>
         <p:spPr bwMode="auto">
           <a:xfrm>
-            <a:off x="665147" y="11141176"/>
+            <a:off x="665146" y="11269263"/>
             <a:ext cx="8628062" cy="1025525"/>
           </a:xfrm>
           <a:prstGeom prst="rect">
@@ -9606,7 +9706,7 @@
                 <a:latin typeface="Calibri" panose="020F0502020204030204" pitchFamily="34" charset="0"/>
                 <a:ea typeface="ヒラギノ角ゴ Pro W3" pitchFamily="1" charset="-128"/>
               </a:rPr>
-              <a:t>Particle-in-cell (PIC) for plasma</a:t>
+              <a:t>Particle-in-cell for plasma</a:t>
             </a:r>
           </a:p>
         </p:txBody>
@@ -10286,76 +10386,6 @@
           </a:prstGeom>
         </p:spPr>
       </p:pic>
-      <p:pic>
-        <p:nvPicPr>
-          <p:cNvPr id="8" name="Picture 7" descr="A graph of different colored dots and numbers&#10;&#10;Description automatically generated">
-            <a:extLst>
-              <a:ext uri="{FF2B5EF4-FFF2-40B4-BE49-F238E27FC236}">
-                <a16:creationId xmlns:a16="http://schemas.microsoft.com/office/drawing/2014/main" id="{4C770F74-3008-ACDE-73D9-BB597775A3DA}"/>
-              </a:ext>
-            </a:extLst>
-          </p:cNvPr>
-          <p:cNvPicPr>
-            <a:picLocks noChangeAspect="1"/>
-          </p:cNvPicPr>
-          <p:nvPr/>
-        </p:nvPicPr>
-        <p:blipFill rotWithShape="1">
-          <a:blip r:embed="rId4" cstate="print">
-            <a:extLst>
-              <a:ext uri="{28A0092B-C50C-407E-A947-70E740481C1C}">
-                <a14:useLocalDpi xmlns:a14="http://schemas.microsoft.com/office/drawing/2010/main" val="0"/>
-              </a:ext>
-            </a:extLst>
-          </a:blip>
-          <a:srcRect b="6771"/>
-          <a:stretch/>
-        </p:blipFill>
-        <p:spPr>
-          <a:xfrm>
-            <a:off x="1179280" y="6309799"/>
-            <a:ext cx="7982167" cy="4131496"/>
-          </a:xfrm>
-          <a:prstGeom prst="rect">
-            <a:avLst/>
-          </a:prstGeom>
-        </p:spPr>
-      </p:pic>
-      <p:pic>
-        <p:nvPicPr>
-          <p:cNvPr id="10" name="Picture 9" descr="A red and blue lines&#10;&#10;Description automatically generated">
-            <a:extLst>
-              <a:ext uri="{FF2B5EF4-FFF2-40B4-BE49-F238E27FC236}">
-                <a16:creationId xmlns:a16="http://schemas.microsoft.com/office/drawing/2014/main" id="{B9E3C66F-3D35-CFF9-6451-F500D56C3570}"/>
-              </a:ext>
-            </a:extLst>
-          </p:cNvPr>
-          <p:cNvPicPr>
-            <a:picLocks noChangeAspect="1"/>
-          </p:cNvPicPr>
-          <p:nvPr/>
-        </p:nvPicPr>
-        <p:blipFill rotWithShape="1">
-          <a:blip r:embed="rId5">
-            <a:extLst>
-              <a:ext uri="{28A0092B-C50C-407E-A947-70E740481C1C}">
-                <a14:useLocalDpi xmlns:a14="http://schemas.microsoft.com/office/drawing/2010/main" val="0"/>
-              </a:ext>
-            </a:extLst>
-          </a:blip>
-          <a:srcRect l="14444" t="4209" b="10367"/>
-          <a:stretch/>
-        </p:blipFill>
-        <p:spPr>
-          <a:xfrm>
-            <a:off x="10365593" y="13726466"/>
-            <a:ext cx="9599818" cy="5070065"/>
-          </a:xfrm>
-          <a:prstGeom prst="rect">
-            <a:avLst/>
-          </a:prstGeom>
-        </p:spPr>
-      </p:pic>
       <p:graphicFrame>
         <p:nvGraphicFramePr>
           <p:cNvPr id="11" name="Chart 10">
@@ -10371,18 +10401,18 @@
           <p:nvPr>
             <p:extLst>
               <p:ext uri="{D42A27DB-BD31-4B8C-83A1-F6EECF244321}">
-                <p14:modId xmlns:p14="http://schemas.microsoft.com/office/powerpoint/2010/main" val="3003791402"/>
+                <p14:modId xmlns:p14="http://schemas.microsoft.com/office/powerpoint/2010/main" val="323205058"/>
               </p:ext>
             </p:extLst>
           </p:nvPr>
         </p:nvGraphicFramePr>
         <p:xfrm>
-          <a:off x="20460907" y="11041574"/>
-          <a:ext cx="4487795" cy="2961896"/>
+          <a:off x="20417874" y="11790757"/>
+          <a:ext cx="4688192" cy="3188949"/>
         </p:xfrm>
         <a:graphic>
           <a:graphicData uri="http://schemas.openxmlformats.org/drawingml/2006/chart">
-            <c:chart xmlns:c="http://schemas.openxmlformats.org/drawingml/2006/chart" xmlns:r="http://schemas.openxmlformats.org/officeDocument/2006/relationships" r:id="rId6"/>
+            <c:chart xmlns:c="http://schemas.openxmlformats.org/drawingml/2006/chart" xmlns:r="http://schemas.openxmlformats.org/officeDocument/2006/relationships" r:id="rId4"/>
           </a:graphicData>
         </a:graphic>
       </p:graphicFrame>
@@ -10401,48 +10431,18 @@
           <p:nvPr>
             <p:extLst>
               <p:ext uri="{D42A27DB-BD31-4B8C-83A1-F6EECF244321}">
-                <p14:modId xmlns:p14="http://schemas.microsoft.com/office/powerpoint/2010/main" val="247054359"/>
+                <p14:modId xmlns:p14="http://schemas.microsoft.com/office/powerpoint/2010/main" val="3027836907"/>
               </p:ext>
             </p:extLst>
           </p:nvPr>
         </p:nvGraphicFramePr>
         <p:xfrm>
-          <a:off x="25209892" y="11041575"/>
-          <a:ext cx="4487795" cy="2961895"/>
+          <a:off x="25195840" y="11790757"/>
+          <a:ext cx="4588835" cy="3188949"/>
         </p:xfrm>
         <a:graphic>
           <a:graphicData uri="http://schemas.openxmlformats.org/drawingml/2006/chart">
-            <c:chart xmlns:c="http://schemas.openxmlformats.org/drawingml/2006/chart" xmlns:r="http://schemas.openxmlformats.org/officeDocument/2006/relationships" r:id="rId7"/>
-          </a:graphicData>
-        </a:graphic>
-      </p:graphicFrame>
-      <p:graphicFrame>
-        <p:nvGraphicFramePr>
-          <p:cNvPr id="14" name="Chart 13">
-            <a:extLst>
-              <a:ext uri="{FF2B5EF4-FFF2-40B4-BE49-F238E27FC236}">
-                <a16:creationId xmlns:a16="http://schemas.microsoft.com/office/drawing/2014/main" id="{5247A2C7-EF08-FCA1-94E5-17A3E8A684CA}"/>
-              </a:ext>
-            </a:extLst>
-          </p:cNvPr>
-          <p:cNvGraphicFramePr>
-            <a:graphicFrameLocks/>
-          </p:cNvGraphicFramePr>
-          <p:nvPr>
-            <p:extLst>
-              <p:ext uri="{D42A27DB-BD31-4B8C-83A1-F6EECF244321}">
-                <p14:modId xmlns:p14="http://schemas.microsoft.com/office/powerpoint/2010/main" val="3115582612"/>
-              </p:ext>
-            </p:extLst>
-          </p:nvPr>
-        </p:nvGraphicFramePr>
-        <p:xfrm>
-          <a:off x="22567602" y="5676063"/>
-          <a:ext cx="4999823" cy="3205677"/>
-        </p:xfrm>
-        <a:graphic>
-          <a:graphicData uri="http://schemas.openxmlformats.org/drawingml/2006/chart">
-            <c:chart xmlns:c="http://schemas.openxmlformats.org/drawingml/2006/chart" xmlns:r="http://schemas.openxmlformats.org/officeDocument/2006/relationships" r:id="rId8"/>
+            <c:chart xmlns:c="http://schemas.openxmlformats.org/drawingml/2006/chart" xmlns:r="http://schemas.openxmlformats.org/officeDocument/2006/relationships" r:id="rId5"/>
           </a:graphicData>
         </a:graphic>
       </p:graphicFrame>
@@ -10748,8 +10748,8 @@
           </a:p>
         </p:txBody>
       </p:sp>
-      <mc:AlternateContent xmlns:mc="http://schemas.openxmlformats.org/markup-compatibility/2006">
-        <mc:Choice xmlns:a14="http://schemas.microsoft.com/office/drawing/2010/main" Requires="a14">
+      <mc:AlternateContent xmlns:mc="http://schemas.openxmlformats.org/markup-compatibility/2006" xmlns:a14="http://schemas.microsoft.com/office/drawing/2010/main">
+        <mc:Choice Requires="a14">
           <p:sp>
             <p:nvSpPr>
               <p:cNvPr id="23" name="Rectangle 36">
@@ -10896,7 +10896,7 @@
                   <a:rPr lang="en-US" altLang="nl-BE" sz="3200" dirty="0">
                     <a:latin typeface="Calibri" panose="020F0502020204030204" pitchFamily="34" charset="0"/>
                   </a:rPr>
-                  <a:t>Uses an expensive fine solver (F) and cheap coarse solver (G)</a:t>
+                  <a:t>Use an expensive fine solver (F) and cheap coarse solver (G)</a:t>
                 </a:r>
               </a:p>
               <a:p>
@@ -10994,7 +10994,7 @@
                           <a:rPr lang="en-US" altLang="nl-BE" sz="3200" b="0" i="1" smtClean="0">
                             <a:latin typeface="Cambria Math" panose="02040503050406030204" pitchFamily="18" charset="0"/>
                           </a:rPr>
-                          <m:t>𝑛</m:t>
+                          <m:t>0</m:t>
                         </m:r>
                       </m:sub>
                       <m:sup>
@@ -11255,7 +11255,7 @@
             </p:txBody>
           </p:sp>
         </mc:Choice>
-        <mc:Fallback>
+        <mc:Fallback xmlns="">
           <p:sp>
             <p:nvSpPr>
               <p:cNvPr id="23" name="Rectangle 36">
@@ -11279,7 +11279,7 @@
                 <a:avLst/>
               </a:prstGeom>
               <a:blipFill>
-                <a:blip r:embed="rId9"/>
+                <a:blip r:embed="rId8"/>
                 <a:stretch>
                   <a:fillRect l="-638" t="-1440"/>
                 </a:stretch>
@@ -11322,7 +11322,7 @@
         </p:nvSpPr>
         <p:spPr>
           <a:xfrm>
-            <a:off x="1745016" y="10447826"/>
+            <a:off x="1775331" y="10805060"/>
             <a:ext cx="5616624" cy="307777"/>
           </a:xfrm>
           <a:prstGeom prst="rect">
@@ -11359,7 +11359,7 @@
         </p:nvSpPr>
         <p:spPr bwMode="auto">
           <a:xfrm>
-            <a:off x="20312016" y="14337545"/>
+            <a:off x="20328100" y="15214517"/>
             <a:ext cx="9510993" cy="1008063"/>
           </a:xfrm>
           <a:prstGeom prst="flowChartProcess">
@@ -11501,8 +11501,8 @@
         </p:nvSpPr>
         <p:spPr bwMode="auto">
           <a:xfrm>
-            <a:off x="20328101" y="15504822"/>
-            <a:ext cx="9494908" cy="3291709"/>
+            <a:off x="20344185" y="16381794"/>
+            <a:ext cx="9494908" cy="2398109"/>
           </a:xfrm>
           <a:prstGeom prst="rect">
             <a:avLst/>
@@ -11646,7 +11646,7 @@
               <a:rPr lang="en-US" altLang="nl-BE" sz="3200" dirty="0">
                 <a:latin typeface="Calibri" panose="020F0502020204030204" pitchFamily="34" charset="0"/>
               </a:rPr>
-              <a:t>Performs best when cost(F) &gt;&gt; cost(G)</a:t>
+              <a:t>Performs best when cost(G) &lt;&lt; cost(F)</a:t>
             </a:r>
           </a:p>
           <a:p>
@@ -11661,7 +11661,7 @@
               <a:rPr lang="en-US" altLang="nl-BE" sz="3200" dirty="0">
                 <a:latin typeface="Calibri" panose="020F0502020204030204" pitchFamily="34" charset="0"/>
               </a:rPr>
-              <a:t>How accurate should solution be</a:t>
+              <a:t>Depends on how accurate solution should be</a:t>
             </a:r>
           </a:p>
         </p:txBody>
@@ -11682,7 +11682,7 @@
         </p:nvSpPr>
         <p:spPr bwMode="auto">
           <a:xfrm>
-            <a:off x="20328100" y="14323471"/>
+            <a:off x="20344184" y="15200443"/>
             <a:ext cx="8928100" cy="1012825"/>
           </a:xfrm>
           <a:prstGeom prst="rect">
@@ -11826,6 +11826,108 @@
           </a:p>
         </p:txBody>
       </p:sp>
+      <p:graphicFrame>
+        <p:nvGraphicFramePr>
+          <p:cNvPr id="5" name="Chart 4">
+            <a:extLst>
+              <a:ext uri="{FF2B5EF4-FFF2-40B4-BE49-F238E27FC236}">
+                <a16:creationId xmlns:a16="http://schemas.microsoft.com/office/drawing/2014/main" id="{5247A2C7-EF08-FCA1-94E5-17A3E8A684CA}"/>
+              </a:ext>
+            </a:extLst>
+          </p:cNvPr>
+          <p:cNvGraphicFramePr>
+            <a:graphicFrameLocks/>
+          </p:cNvGraphicFramePr>
+          <p:nvPr>
+            <p:extLst>
+              <p:ext uri="{D42A27DB-BD31-4B8C-83A1-F6EECF244321}">
+                <p14:modId xmlns:p14="http://schemas.microsoft.com/office/powerpoint/2010/main" val="1344651615"/>
+              </p:ext>
+            </p:extLst>
+          </p:nvPr>
+        </p:nvGraphicFramePr>
+        <p:xfrm>
+          <a:off x="22340787" y="5699988"/>
+          <a:ext cx="5262022" cy="3273951"/>
+        </p:xfrm>
+        <a:graphic>
+          <a:graphicData uri="http://schemas.openxmlformats.org/drawingml/2006/chart">
+            <c:chart xmlns:c="http://schemas.openxmlformats.org/drawingml/2006/chart" xmlns:r="http://schemas.openxmlformats.org/officeDocument/2006/relationships" r:id="rId9"/>
+          </a:graphicData>
+        </a:graphic>
+      </p:graphicFrame>
+      <p:pic>
+        <p:nvPicPr>
+          <p:cNvPr id="16" name="Picture 15" descr="A diagram of a phase space&#10;&#10;Description automatically generated with medium confidence">
+            <a:extLst>
+              <a:ext uri="{FF2B5EF4-FFF2-40B4-BE49-F238E27FC236}">
+                <a16:creationId xmlns:a16="http://schemas.microsoft.com/office/drawing/2014/main" id="{D775B8FB-9EEF-5839-2C2E-779D25F44D72}"/>
+              </a:ext>
+            </a:extLst>
+          </p:cNvPr>
+          <p:cNvPicPr>
+            <a:picLocks noChangeAspect="1"/>
+          </p:cNvPicPr>
+          <p:nvPr/>
+        </p:nvPicPr>
+        <p:blipFill>
+          <a:blip r:embed="rId10" cstate="print">
+            <a:extLst>
+              <a:ext uri="{28A0092B-C50C-407E-A947-70E740481C1C}">
+                <a14:useLocalDpi xmlns:a14="http://schemas.microsoft.com/office/drawing/2010/main" val="0"/>
+              </a:ext>
+            </a:extLst>
+          </a:blip>
+          <a:stretch>
+            <a:fillRect/>
+          </a:stretch>
+        </p:blipFill>
+        <p:spPr>
+          <a:xfrm>
+            <a:off x="10365593" y="12824504"/>
+            <a:ext cx="9555245" cy="5972028"/>
+          </a:xfrm>
+          <a:prstGeom prst="rect">
+            <a:avLst/>
+          </a:prstGeom>
+        </p:spPr>
+      </p:pic>
+      <p:pic>
+        <p:nvPicPr>
+          <p:cNvPr id="22" name="Picture 21" descr="A graph of different colored dots and numbers&#10;&#10;Description automatically generated">
+            <a:extLst>
+              <a:ext uri="{FF2B5EF4-FFF2-40B4-BE49-F238E27FC236}">
+                <a16:creationId xmlns:a16="http://schemas.microsoft.com/office/drawing/2014/main" id="{CEF4F3B7-6161-7959-EECA-BB140DF1F221}"/>
+              </a:ext>
+            </a:extLst>
+          </p:cNvPr>
+          <p:cNvPicPr>
+            <a:picLocks noChangeAspect="1"/>
+          </p:cNvPicPr>
+          <p:nvPr/>
+        </p:nvPicPr>
+        <p:blipFill>
+          <a:blip r:embed="rId11">
+            <a:extLst>
+              <a:ext uri="{28A0092B-C50C-407E-A947-70E740481C1C}">
+                <a14:useLocalDpi xmlns:a14="http://schemas.microsoft.com/office/drawing/2010/main" val="0"/>
+              </a:ext>
+            </a:extLst>
+          </a:blip>
+          <a:stretch>
+            <a:fillRect/>
+          </a:stretch>
+        </p:blipFill>
+        <p:spPr>
+          <a:xfrm>
+            <a:off x="1386459" y="6320668"/>
+            <a:ext cx="7050734" cy="4468146"/>
+          </a:xfrm>
+          <a:prstGeom prst="rect">
+            <a:avLst/>
+          </a:prstGeom>
+        </p:spPr>
+      </p:pic>
     </p:spTree>
   </p:cSld>
   <p:clrMapOvr>

</xml_diff>